<commit_message>
Pt2 lecture 3: maps and sets edited
</commit_message>
<xml_diff>
--- a/pt2/lectures/lecture3/lecture3.pptx
+++ b/pt2/lectures/lecture3/lecture3.pptx
@@ -5,7 +5,7 @@
     <p:sldMasterId id="2147483660" r:id="rId1"/>
   </p:sldMasterIdLst>
   <p:notesMasterIdLst>
-    <p:notesMasterId r:id="rId17"/>
+    <p:notesMasterId r:id="rId19"/>
   </p:notesMasterIdLst>
   <p:sldIdLst>
     <p:sldId id="256" r:id="rId2"/>
@@ -23,6 +23,8 @@
     <p:sldId id="262" r:id="rId14"/>
     <p:sldId id="263" r:id="rId15"/>
     <p:sldId id="264" r:id="rId16"/>
+    <p:sldId id="272" r:id="rId17"/>
+    <p:sldId id="273" r:id="rId18"/>
   </p:sldIdLst>
   <p:sldSz cx="12192000" cy="6858000"/>
   <p:notesSz cx="6858000" cy="9144000"/>
@@ -211,7 +213,7 @@
           <a:p>
             <a:fld id="{7AB54776-5C19-4010-B03E-1D9819AD498B}" type="datetimeFigureOut">
               <a:rPr lang="en-US" smtClean="0"/>
-              <a:t>9/27/2021</a:t>
+              <a:t>10/12/2022</a:t>
             </a:fld>
             <a:endParaRPr lang="en-US"/>
           </a:p>
@@ -1201,7 +1203,7 @@
           <a:p>
             <a:fld id="{78B714E4-0873-4C87-8B25-50C01080B0FC}" type="datetimeFigureOut">
               <a:rPr lang="en-US" smtClean="0"/>
-              <a:t>9/27/2021</a:t>
+              <a:t>10/12/2022</a:t>
             </a:fld>
             <a:endParaRPr lang="en-US"/>
           </a:p>
@@ -1452,7 +1454,7 @@
           <a:p>
             <a:fld id="{78B714E4-0873-4C87-8B25-50C01080B0FC}" type="datetimeFigureOut">
               <a:rPr lang="en-US" smtClean="0"/>
-              <a:t>9/27/2021</a:t>
+              <a:t>10/12/2022</a:t>
             </a:fld>
             <a:endParaRPr lang="en-US"/>
           </a:p>
@@ -1766,7 +1768,7 @@
           <a:p>
             <a:fld id="{78B714E4-0873-4C87-8B25-50C01080B0FC}" type="datetimeFigureOut">
               <a:rPr lang="en-US" smtClean="0"/>
-              <a:t>9/27/2021</a:t>
+              <a:t>10/12/2022</a:t>
             </a:fld>
             <a:endParaRPr lang="en-US"/>
           </a:p>
@@ -2107,7 +2109,7 @@
           <a:p>
             <a:fld id="{78B714E4-0873-4C87-8B25-50C01080B0FC}" type="datetimeFigureOut">
               <a:rPr lang="en-US" smtClean="0"/>
-              <a:t>9/27/2021</a:t>
+              <a:t>10/12/2022</a:t>
             </a:fld>
             <a:endParaRPr lang="en-US"/>
           </a:p>
@@ -2421,7 +2423,7 @@
           <a:p>
             <a:fld id="{78B714E4-0873-4C87-8B25-50C01080B0FC}" type="datetimeFigureOut">
               <a:rPr lang="en-US" smtClean="0"/>
-              <a:t>9/27/2021</a:t>
+              <a:t>10/12/2022</a:t>
             </a:fld>
             <a:endParaRPr lang="en-US"/>
           </a:p>
@@ -2814,7 +2816,7 @@
           <a:p>
             <a:fld id="{78B714E4-0873-4C87-8B25-50C01080B0FC}" type="datetimeFigureOut">
               <a:rPr lang="en-US" smtClean="0"/>
-              <a:t>9/27/2021</a:t>
+              <a:t>10/12/2022</a:t>
             </a:fld>
             <a:endParaRPr lang="en-US"/>
           </a:p>
@@ -2984,7 +2986,7 @@
           <a:p>
             <a:fld id="{78B714E4-0873-4C87-8B25-50C01080B0FC}" type="datetimeFigureOut">
               <a:rPr lang="en-US" smtClean="0"/>
-              <a:t>9/27/2021</a:t>
+              <a:t>10/12/2022</a:t>
             </a:fld>
             <a:endParaRPr lang="en-US"/>
           </a:p>
@@ -3164,7 +3166,7 @@
           <a:p>
             <a:fld id="{78B714E4-0873-4C87-8B25-50C01080B0FC}" type="datetimeFigureOut">
               <a:rPr lang="en-US" smtClean="0"/>
-              <a:t>9/27/2021</a:t>
+              <a:t>10/12/2022</a:t>
             </a:fld>
             <a:endParaRPr lang="en-US"/>
           </a:p>
@@ -3340,7 +3342,7 @@
           <a:p>
             <a:fld id="{78B714E4-0873-4C87-8B25-50C01080B0FC}" type="datetimeFigureOut">
               <a:rPr lang="en-US" smtClean="0"/>
-              <a:t>9/27/2021</a:t>
+              <a:t>10/12/2022</a:t>
             </a:fld>
             <a:endParaRPr lang="en-US"/>
           </a:p>
@@ -3587,7 +3589,7 @@
           <a:p>
             <a:fld id="{78B714E4-0873-4C87-8B25-50C01080B0FC}" type="datetimeFigureOut">
               <a:rPr lang="en-US" smtClean="0"/>
-              <a:t>9/27/2021</a:t>
+              <a:t>10/12/2022</a:t>
             </a:fld>
             <a:endParaRPr lang="en-US"/>
           </a:p>
@@ -3819,7 +3821,7 @@
           <a:p>
             <a:fld id="{78B714E4-0873-4C87-8B25-50C01080B0FC}" type="datetimeFigureOut">
               <a:rPr lang="en-US" smtClean="0"/>
-              <a:t>9/27/2021</a:t>
+              <a:t>10/12/2022</a:t>
             </a:fld>
             <a:endParaRPr lang="en-US"/>
           </a:p>
@@ -4193,7 +4195,7 @@
           <a:p>
             <a:fld id="{78B714E4-0873-4C87-8B25-50C01080B0FC}" type="datetimeFigureOut">
               <a:rPr lang="en-US" smtClean="0"/>
-              <a:t>9/27/2021</a:t>
+              <a:t>10/12/2022</a:t>
             </a:fld>
             <a:endParaRPr lang="en-US"/>
           </a:p>
@@ -4316,7 +4318,7 @@
           <a:p>
             <a:fld id="{78B714E4-0873-4C87-8B25-50C01080B0FC}" type="datetimeFigureOut">
               <a:rPr lang="en-US" smtClean="0"/>
-              <a:t>9/27/2021</a:t>
+              <a:t>10/12/2022</a:t>
             </a:fld>
             <a:endParaRPr lang="en-US"/>
           </a:p>
@@ -4411,7 +4413,7 @@
           <a:p>
             <a:fld id="{78B714E4-0873-4C87-8B25-50C01080B0FC}" type="datetimeFigureOut">
               <a:rPr lang="en-US" smtClean="0"/>
-              <a:t>9/27/2021</a:t>
+              <a:t>10/12/2022</a:t>
             </a:fld>
             <a:endParaRPr lang="en-US"/>
           </a:p>
@@ -4666,7 +4668,7 @@
           <a:p>
             <a:fld id="{78B714E4-0873-4C87-8B25-50C01080B0FC}" type="datetimeFigureOut">
               <a:rPr lang="en-US" smtClean="0"/>
-              <a:t>9/27/2021</a:t>
+              <a:t>10/12/2022</a:t>
             </a:fld>
             <a:endParaRPr lang="en-US"/>
           </a:p>
@@ -4929,7 +4931,7 @@
           <a:p>
             <a:fld id="{78B714E4-0873-4C87-8B25-50C01080B0FC}" type="datetimeFigureOut">
               <a:rPr lang="en-US" smtClean="0"/>
-              <a:t>9/27/2021</a:t>
+              <a:t>10/12/2022</a:t>
             </a:fld>
             <a:endParaRPr lang="en-US"/>
           </a:p>
@@ -5672,7 +5674,7 @@
           <a:p>
             <a:fld id="{78B714E4-0873-4C87-8B25-50C01080B0FC}" type="datetimeFigureOut">
               <a:rPr lang="en-US" smtClean="0"/>
-              <a:t>9/27/2021</a:t>
+              <a:t>10/12/2022</a:t>
             </a:fld>
             <a:endParaRPr lang="en-US"/>
           </a:p>
@@ -6201,7 +6203,7 @@
           <p:cNvPr id="4" name="Title 1">
             <a:extLst>
               <a:ext uri="{FF2B5EF4-FFF2-40B4-BE49-F238E27FC236}">
-                <a16:creationId xmlns:a16="http://schemas.microsoft.com/office/drawing/2014/main" xmlns="" id="{13B2D513-0F9C-4439-A697-A295339863B6}"/>
+                <a16:creationId xmlns="" xmlns:a16="http://schemas.microsoft.com/office/drawing/2014/main" id="{13B2D513-0F9C-4439-A697-A295339863B6}"/>
               </a:ext>
             </a:extLst>
           </p:cNvPr>
@@ -6244,7 +6246,7 @@
           <p:cNvPr id="5" name="Subtitle 2">
             <a:extLst>
               <a:ext uri="{FF2B5EF4-FFF2-40B4-BE49-F238E27FC236}">
-                <a16:creationId xmlns:a16="http://schemas.microsoft.com/office/drawing/2014/main" xmlns="" id="{37C9EE23-73D5-41F8-AFFF-4BA477FCB643}"/>
+                <a16:creationId xmlns="" xmlns:a16="http://schemas.microsoft.com/office/drawing/2014/main" id="{37C9EE23-73D5-41F8-AFFF-4BA477FCB643}"/>
               </a:ext>
             </a:extLst>
           </p:cNvPr>
@@ -6296,7 +6298,7 @@
             </a:r>
           </a:p>
           <a:p>
-            <a:pPr marL="461963" indent="-404813" algn="l">
+            <a:pPr marL="738188" indent="-276225" algn="l">
               <a:buSzPct val="100000"/>
               <a:buFont typeface="Arial" panose="020B0604020202020204" pitchFamily="34" charset="0"/>
               <a:buChar char="•"/>
@@ -6565,7 +6567,6 @@
               <a:rPr lang="en-US" dirty="0"/>
               <a:t>3</a:t>
             </a:r>
-            <a:endParaRPr lang="en-US" dirty="0"/>
           </a:p>
         </p:txBody>
       </p:sp>
@@ -8699,7 +8700,6 @@
               <a:rPr lang="en-US" dirty="0"/>
               <a:t>3</a:t>
             </a:r>
-            <a:endParaRPr lang="en-US" dirty="0"/>
           </a:p>
         </p:txBody>
       </p:sp>
@@ -8837,7 +8837,6 @@
               <a:rPr lang="en-US" dirty="0"/>
               <a:t>3</a:t>
             </a:r>
-            <a:endParaRPr lang="en-US" dirty="0"/>
           </a:p>
         </p:txBody>
       </p:sp>
@@ -9024,7 +9023,7 @@
         </p:nvSpPr>
         <p:spPr>
           <a:xfrm>
-            <a:off x="5369106" y="970961"/>
+            <a:off x="5369106" y="981612"/>
             <a:ext cx="6555801" cy="5637229"/>
           </a:xfrm>
           <a:solidFill>
@@ -9037,7 +9036,11 @@
           <a:p>
             <a:r>
               <a:rPr lang="ru-RU" dirty="0" smtClean="0"/>
-              <a:t>Новый узел всегда красный. Вставляем на нижний уровень дерева на позицию, соответствующую критериям </a:t>
+              <a:t>Новый </a:t>
+            </a:r>
+            <a:r>
+              <a:rPr lang="ru-RU" dirty="0" smtClean="0"/>
+              <a:t>узел всегда красный. Вставляем на нижний уровень дерева на позицию, соответствующую критериям </a:t>
             </a:r>
             <a:r>
               <a:rPr lang="en-US" dirty="0" smtClean="0"/>
@@ -9321,6 +9324,11 @@
           <a:prstGeom prst="ellipse">
             <a:avLst/>
           </a:prstGeom>
+          <a:ln w="76200">
+            <a:solidFill>
+              <a:srgbClr val="0070C0"/>
+            </a:solidFill>
+          </a:ln>
         </p:spPr>
         <p:style>
           <a:lnRef idx="3">
@@ -9706,12 +9714,17 @@
         </p:nvSpPr>
         <p:spPr>
           <a:xfrm>
-            <a:off x="649431" y="5944410"/>
+            <a:off x="640195" y="5944410"/>
             <a:ext cx="729343" cy="707572"/>
           </a:xfrm>
           <a:prstGeom prst="ellipse">
             <a:avLst/>
           </a:prstGeom>
+          <a:ln w="76200">
+            <a:solidFill>
+              <a:srgbClr val="0070C0"/>
+            </a:solidFill>
+          </a:ln>
         </p:spPr>
         <p:style>
           <a:lnRef idx="3">
@@ -10102,15 +10115,7 @@
             </a:pPr>
             <a:r>
               <a:rPr lang="ru-RU" dirty="0" smtClean="0"/>
-              <a:t>Правый поворот узл</a:t>
-            </a:r>
-            <a:r>
-              <a:rPr lang="ru-RU" dirty="0"/>
-              <a:t>а</a:t>
-            </a:r>
-            <a:r>
-              <a:rPr lang="ru-RU" dirty="0" smtClean="0"/>
-              <a:t> </a:t>
+              <a:t>Правый поворот узла </a:t>
             </a:r>
             <a:r>
               <a:rPr lang="en-US" dirty="0" smtClean="0"/>
@@ -10124,7 +10129,11 @@
             </a:pPr>
             <a:r>
               <a:rPr lang="ru-RU" dirty="0" smtClean="0"/>
-              <a:t>Обмен цветов </a:t>
+              <a:t>Обмен </a:t>
+            </a:r>
+            <a:r>
+              <a:rPr lang="ru-RU" dirty="0" smtClean="0"/>
+              <a:t>цветов </a:t>
             </a:r>
             <a:r>
               <a:rPr lang="en-US" dirty="0" smtClean="0"/>
@@ -10342,6 +10351,11 @@
           <a:prstGeom prst="ellipse">
             <a:avLst/>
           </a:prstGeom>
+          <a:ln w="76200">
+            <a:solidFill>
+              <a:srgbClr val="0070C0"/>
+            </a:solidFill>
+          </a:ln>
         </p:spPr>
         <p:style>
           <a:lnRef idx="3">
@@ -10782,6 +10796,11 @@
           <a:prstGeom prst="ellipse">
             <a:avLst/>
           </a:prstGeom>
+          <a:ln w="76200">
+            <a:solidFill>
+              <a:srgbClr val="0070C0"/>
+            </a:solidFill>
+          </a:ln>
         </p:spPr>
         <p:style>
           <a:lnRef idx="3">
@@ -11439,6 +11458,11 @@
           <a:prstGeom prst="ellipse">
             <a:avLst/>
           </a:prstGeom>
+          <a:ln w="76200">
+            <a:solidFill>
+              <a:srgbClr val="0070C0"/>
+            </a:solidFill>
+          </a:ln>
         </p:spPr>
         <p:style>
           <a:lnRef idx="3">
@@ -12021,115 +12045,117 @@
         </p:nvSpPr>
         <p:spPr>
           <a:xfrm>
-            <a:off x="299573" y="4938647"/>
-            <a:ext cx="11660670" cy="1850341"/>
+            <a:off x="317538" y="5215495"/>
+            <a:ext cx="11660670" cy="1549846"/>
           </a:xfrm>
           <a:solidFill>
             <a:schemeClr val="bg1"/>
           </a:solidFill>
         </p:spPr>
         <p:txBody>
-          <a:bodyPr/>
-          <a:lstStyle/>
-          <a:p>
-            <a:r>
-              <a:rPr lang="ru-RU" dirty="0"/>
+          <a:bodyPr>
+            <a:normAutofit fontScale="92500" lnSpcReduction="10000"/>
+          </a:bodyPr>
+          <a:lstStyle/>
+          <a:p>
+            <a:r>
+              <a:rPr lang="ru-RU" sz="1600" dirty="0"/>
               <a:t>Случай </a:t>
             </a:r>
             <a:r>
-              <a:rPr lang="en-US" dirty="0" smtClean="0"/>
+              <a:rPr lang="en-US" sz="1600" dirty="0" smtClean="0"/>
               <a:t>2: </a:t>
             </a:r>
             <a:r>
-              <a:rPr lang="ru-RU" dirty="0"/>
+              <a:rPr lang="ru-RU" sz="1600" dirty="0"/>
               <a:t>узел </a:t>
             </a:r>
             <a:r>
-              <a:rPr lang="en-US" dirty="0"/>
+              <a:rPr lang="en-US" sz="1600" dirty="0"/>
               <a:t>U (</a:t>
             </a:r>
             <a:r>
-              <a:rPr lang="ru-RU" dirty="0"/>
+              <a:rPr lang="ru-RU" sz="1600" dirty="0"/>
               <a:t>дядя</a:t>
             </a:r>
             <a:r>
-              <a:rPr lang="en-US" dirty="0"/>
+              <a:rPr lang="en-US" sz="1600" dirty="0"/>
               <a:t>)</a:t>
             </a:r>
             <a:r>
-              <a:rPr lang="ru-RU" dirty="0"/>
+              <a:rPr lang="ru-RU" sz="1600" dirty="0"/>
               <a:t> – чёрный, узлы </a:t>
             </a:r>
             <a:r>
-              <a:rPr lang="en-US" dirty="0"/>
+              <a:rPr lang="en-US" sz="1600" dirty="0"/>
               <a:t>X, P, </a:t>
             </a:r>
             <a:r>
-              <a:rPr lang="en-US" dirty="0" smtClean="0"/>
+              <a:rPr lang="en-US" sz="1600" dirty="0" smtClean="0"/>
               <a:t>G </a:t>
             </a:r>
             <a:r>
-              <a:rPr lang="ru-RU" dirty="0"/>
+              <a:rPr lang="ru-RU" sz="1600" dirty="0"/>
               <a:t>образуют </a:t>
             </a:r>
             <a:r>
-              <a:rPr lang="ru-RU" dirty="0" smtClean="0"/>
+              <a:rPr lang="ru-RU" sz="1600" dirty="0" smtClean="0"/>
               <a:t>«треугольник» </a:t>
             </a:r>
             <a:r>
-              <a:rPr lang="ru-RU" dirty="0"/>
+              <a:rPr lang="ru-RU" sz="1600" dirty="0"/>
               <a:t>(</a:t>
             </a:r>
             <a:r>
-              <a:rPr lang="en-US" dirty="0"/>
+              <a:rPr lang="en-US" sz="1600" dirty="0"/>
               <a:t>X – </a:t>
             </a:r>
             <a:r>
-              <a:rPr lang="ru-RU" dirty="0" smtClean="0"/>
+              <a:rPr lang="ru-RU" sz="1600" dirty="0" smtClean="0"/>
               <a:t>правый </a:t>
             </a:r>
             <a:r>
-              <a:rPr lang="ru-RU" dirty="0"/>
+              <a:rPr lang="ru-RU" sz="1600" dirty="0"/>
               <a:t>потомок </a:t>
             </a:r>
             <a:r>
-              <a:rPr lang="en-US" dirty="0"/>
+              <a:rPr lang="en-US" sz="1600" dirty="0"/>
               <a:t>P, </a:t>
             </a:r>
             <a:r>
-              <a:rPr lang="ru-RU" dirty="0"/>
+              <a:rPr lang="ru-RU" sz="1600" dirty="0"/>
               <a:t>родитель </a:t>
             </a:r>
             <a:r>
-              <a:rPr lang="en-US" dirty="0"/>
+              <a:rPr lang="en-US" sz="1600" dirty="0"/>
               <a:t>P </a:t>
             </a:r>
             <a:r>
-              <a:rPr lang="ru-RU" dirty="0"/>
+              <a:rPr lang="ru-RU" sz="1600" dirty="0"/>
               <a:t>нового узла </a:t>
             </a:r>
             <a:r>
-              <a:rPr lang="en-US" dirty="0"/>
+              <a:rPr lang="en-US" sz="1600" dirty="0"/>
               <a:t>X – </a:t>
             </a:r>
             <a:r>
-              <a:rPr lang="ru-RU" dirty="0"/>
+              <a:rPr lang="ru-RU" sz="1600" dirty="0"/>
               <a:t>левый</a:t>
             </a:r>
             <a:r>
-              <a:rPr lang="en-US" dirty="0"/>
+              <a:rPr lang="en-US" sz="1600" dirty="0"/>
               <a:t> </a:t>
             </a:r>
             <a:r>
-              <a:rPr lang="ru-RU" dirty="0"/>
+              <a:rPr lang="ru-RU" sz="1600" dirty="0"/>
               <a:t>потомок узла </a:t>
             </a:r>
             <a:r>
-              <a:rPr lang="en-US" dirty="0"/>
+              <a:rPr lang="en-US" sz="1600" dirty="0"/>
               <a:t>G</a:t>
             </a:r>
             <a:r>
-              <a:rPr lang="ru-RU" dirty="0" smtClean="0"/>
+              <a:rPr lang="ru-RU" sz="1600" dirty="0" smtClean="0"/>
               <a:t>)</a:t>
             </a:r>
           </a:p>
@@ -12139,11 +12165,11 @@
               <a:buAutoNum type="arabicPeriod"/>
             </a:pPr>
             <a:r>
-              <a:rPr lang="ru-RU" dirty="0" smtClean="0"/>
+              <a:rPr lang="ru-RU" sz="1600" dirty="0" smtClean="0"/>
               <a:t>Левый поворот узла </a:t>
             </a:r>
             <a:r>
-              <a:rPr lang="en-US" dirty="0" smtClean="0"/>
+              <a:rPr lang="en-US" sz="1600" dirty="0" smtClean="0"/>
               <a:t>P </a:t>
             </a:r>
           </a:p>
@@ -12153,14 +12179,14 @@
               <a:buAutoNum type="arabicPeriod"/>
             </a:pPr>
             <a:r>
-              <a:rPr lang="ru-RU" dirty="0" smtClean="0"/>
+              <a:rPr lang="ru-RU" sz="1600" dirty="0" smtClean="0"/>
               <a:t>Правый поворот узла </a:t>
             </a:r>
             <a:r>
-              <a:rPr lang="en-US" dirty="0" smtClean="0"/>
+              <a:rPr lang="en-US" sz="1600" dirty="0" smtClean="0"/>
               <a:t>G</a:t>
             </a:r>
-            <a:endParaRPr lang="ru-RU" dirty="0" smtClean="0"/>
+            <a:endParaRPr lang="ru-RU" sz="1600" dirty="0" smtClean="0"/>
           </a:p>
           <a:p>
             <a:pPr>
@@ -12168,32 +12194,32 @@
               <a:buAutoNum type="arabicPeriod"/>
             </a:pPr>
             <a:r>
-              <a:rPr lang="ru-RU" dirty="0" smtClean="0"/>
+              <a:rPr lang="ru-RU" sz="1600" dirty="0" smtClean="0"/>
               <a:t>Обмен цветов </a:t>
             </a:r>
             <a:r>
-              <a:rPr lang="en-US" dirty="0" smtClean="0"/>
+              <a:rPr lang="en-US" sz="1600" dirty="0" smtClean="0"/>
               <a:t>X </a:t>
             </a:r>
             <a:r>
-              <a:rPr lang="ru-RU" dirty="0" smtClean="0"/>
+              <a:rPr lang="ru-RU" sz="1600" dirty="0" smtClean="0"/>
               <a:t>и </a:t>
             </a:r>
             <a:r>
-              <a:rPr lang="en-US" dirty="0" smtClean="0"/>
+              <a:rPr lang="en-US" sz="1600" dirty="0" smtClean="0"/>
               <a:t>G</a:t>
             </a:r>
-            <a:endParaRPr lang="ru-RU" dirty="0" smtClean="0"/>
+            <a:endParaRPr lang="ru-RU" sz="1600" dirty="0" smtClean="0"/>
           </a:p>
           <a:p>
             <a:pPr>
               <a:buFont typeface="+mj-lt"/>
               <a:buAutoNum type="arabicPeriod"/>
             </a:pPr>
-            <a:endParaRPr lang="ru-RU" dirty="0"/>
-          </a:p>
-          <a:p>
-            <a:endParaRPr lang="en-US" dirty="0"/>
+            <a:endParaRPr lang="ru-RU" sz="1600" dirty="0"/>
+          </a:p>
+          <a:p>
+            <a:endParaRPr lang="en-US" sz="1600" dirty="0"/>
           </a:p>
         </p:txBody>
       </p:sp>
@@ -12562,9 +12588,9 @@
           <p:nvPr/>
         </p:nvCxnSpPr>
         <p:spPr>
-          <a:xfrm>
-            <a:off x="2263544" y="2508877"/>
-            <a:ext cx="24884" cy="740596"/>
+          <a:xfrm flipH="1">
+            <a:off x="2131416" y="2508877"/>
+            <a:ext cx="132128" cy="749832"/>
           </a:xfrm>
           <a:prstGeom prst="line">
             <a:avLst/>
@@ -12708,7 +12734,7 @@
         </p:nvSpPr>
         <p:spPr>
           <a:xfrm>
-            <a:off x="2067855" y="3249473"/>
+            <a:off x="1910843" y="3258709"/>
             <a:ext cx="441146" cy="369332"/>
           </a:xfrm>
           <a:prstGeom prst="rect">
@@ -13133,6 +13159,11 @@
           <a:prstGeom prst="ellipse">
             <a:avLst/>
           </a:prstGeom>
+          <a:ln w="76200">
+            <a:solidFill>
+              <a:srgbClr val="0070C0"/>
+            </a:solidFill>
+          </a:ln>
         </p:spPr>
         <p:style>
           <a:lnRef idx="3">
@@ -13730,7 +13761,6 @@
               <a:rPr lang="en-US" dirty="0"/>
               <a:t>P</a:t>
             </a:r>
-            <a:endParaRPr lang="en-US" dirty="0"/>
           </a:p>
         </p:txBody>
       </p:sp>
@@ -13881,6 +13911,11 @@
           <a:prstGeom prst="ellipse">
             <a:avLst/>
           </a:prstGeom>
+          <a:ln w="76200">
+            <a:solidFill>
+              <a:srgbClr val="0070C0"/>
+            </a:solidFill>
+          </a:ln>
         </p:spPr>
         <p:style>
           <a:lnRef idx="3">
@@ -14018,7 +14053,7 @@
         </p:nvCxnSpPr>
         <p:spPr>
           <a:xfrm flipH="1">
-            <a:off x="8571359" y="3590782"/>
+            <a:off x="8626775" y="3590782"/>
             <a:ext cx="232222" cy="835411"/>
           </a:xfrm>
           <a:prstGeom prst="line">
@@ -14050,9 +14085,9 @@
           <p:nvPr/>
         </p:nvCxnSpPr>
         <p:spPr>
-          <a:xfrm flipH="1">
-            <a:off x="9393858" y="3655347"/>
-            <a:ext cx="20607" cy="758622"/>
+          <a:xfrm>
+            <a:off x="9414465" y="3655347"/>
+            <a:ext cx="339612" cy="758622"/>
           </a:xfrm>
           <a:prstGeom prst="line">
             <a:avLst/>
@@ -14130,7 +14165,7 @@
         </p:nvSpPr>
         <p:spPr>
           <a:xfrm>
-            <a:off x="8350786" y="4426193"/>
+            <a:off x="8406202" y="4426193"/>
             <a:ext cx="441146" cy="369332"/>
           </a:xfrm>
           <a:prstGeom prst="rect">
@@ -14178,7 +14213,7 @@
         </p:nvSpPr>
         <p:spPr>
           <a:xfrm>
-            <a:off x="9173285" y="4413969"/>
+            <a:off x="9533504" y="4413969"/>
             <a:ext cx="441146" cy="369332"/>
           </a:xfrm>
           <a:prstGeom prst="rect">
@@ -14589,6 +14624,11 @@
           <a:prstGeom prst="ellipse">
             <a:avLst/>
           </a:prstGeom>
+          <a:ln w="76200">
+            <a:solidFill>
+              <a:srgbClr val="0070C0"/>
+            </a:solidFill>
+          </a:ln>
         </p:spPr>
         <p:style>
           <a:lnRef idx="2">
@@ -15053,7 +15093,7 @@
         </p:nvSpPr>
         <p:spPr>
           <a:xfrm>
-            <a:off x="3274465" y="5848638"/>
+            <a:off x="2772996" y="5822633"/>
             <a:ext cx="466795" cy="1015663"/>
           </a:xfrm>
           <a:prstGeom prst="rect">
@@ -15083,7 +15123,7 @@
         </p:nvSpPr>
         <p:spPr>
           <a:xfrm>
-            <a:off x="3681173" y="6186699"/>
+            <a:off x="3249805" y="6133578"/>
             <a:ext cx="1128835" cy="369332"/>
           </a:xfrm>
           <a:prstGeom prst="rect">
@@ -15161,6 +15201,11 @@
           <a:prstGeom prst="ellipse">
             <a:avLst/>
           </a:prstGeom>
+          <a:ln w="76200">
+            <a:solidFill>
+              <a:srgbClr val="0070C0"/>
+            </a:solidFill>
+          </a:ln>
         </p:spPr>
         <p:style>
           <a:lnRef idx="3">
@@ -16779,8 +16824,8 @@
         </p:nvCxnSpPr>
         <p:spPr>
           <a:xfrm flipH="1">
-            <a:off x="7478000" y="2472509"/>
-            <a:ext cx="369831" cy="725017"/>
+            <a:off x="7542652" y="2472509"/>
+            <a:ext cx="305179" cy="725017"/>
           </a:xfrm>
           <a:prstGeom prst="line">
             <a:avLst/>
@@ -16841,7 +16886,7 @@
         </p:nvSpPr>
         <p:spPr>
           <a:xfrm>
-            <a:off x="7257427" y="3197526"/>
+            <a:off x="7322079" y="3197526"/>
             <a:ext cx="441146" cy="369332"/>
           </a:xfrm>
           <a:prstGeom prst="rect">
@@ -17317,7 +17362,6 @@
               <a:rPr lang="en-US" sz="1600" dirty="0"/>
               <a:t>P</a:t>
             </a:r>
-            <a:endParaRPr lang="en-US" sz="1600" dirty="0"/>
           </a:p>
         </p:txBody>
       </p:sp>
@@ -17612,6 +17656,1319 @@
 </p:sld>
 </file>
 
+<file path=ppt/slides/slide16.xml><?xml version="1.0" encoding="utf-8"?>
+<p:sld xmlns:a="http://schemas.openxmlformats.org/drawingml/2006/main" xmlns:r="http://schemas.openxmlformats.org/officeDocument/2006/relationships" xmlns:p="http://schemas.openxmlformats.org/presentationml/2006/main">
+  <p:cSld>
+    <p:spTree>
+      <p:nvGrpSpPr>
+        <p:cNvPr id="1" name=""/>
+        <p:cNvGrpSpPr/>
+        <p:nvPr/>
+      </p:nvGrpSpPr>
+      <p:grpSpPr>
+        <a:xfrm>
+          <a:off x="0" y="0"/>
+          <a:ext cx="0" cy="0"/>
+          <a:chOff x="0" y="0"/>
+          <a:chExt cx="0" cy="0"/>
+        </a:xfrm>
+      </p:grpSpPr>
+      <p:sp>
+        <p:nvSpPr>
+          <p:cNvPr id="3" name="Объект 2"/>
+          <p:cNvSpPr>
+            <a:spLocks noGrp="1"/>
+          </p:cNvSpPr>
+          <p:nvPr>
+            <p:ph idx="1"/>
+          </p:nvPr>
+        </p:nvSpPr>
+        <p:spPr>
+          <a:xfrm>
+            <a:off x="5708073" y="1099127"/>
+            <a:ext cx="6326634" cy="5487121"/>
+          </a:xfrm>
+          <a:solidFill>
+            <a:schemeClr val="bg1"/>
+          </a:solidFill>
+        </p:spPr>
+        <p:txBody>
+          <a:bodyPr>
+            <a:normAutofit/>
+          </a:bodyPr>
+          <a:lstStyle/>
+          <a:p>
+            <a:r>
+              <a:rPr lang="ru-RU" sz="2000" dirty="0" smtClean="0"/>
+              <a:t>Итератор </a:t>
+            </a:r>
+            <a:r>
+              <a:rPr lang="en-US" sz="2000" dirty="0" err="1" smtClean="0"/>
+              <a:t>std</a:t>
+            </a:r>
+            <a:r>
+              <a:rPr lang="en-US" sz="2000" dirty="0" smtClean="0"/>
+              <a:t>::map </a:t>
+            </a:r>
+            <a:r>
+              <a:rPr lang="ru-RU" sz="2000" dirty="0" smtClean="0"/>
+              <a:t>указывает на пару значений:</a:t>
+            </a:r>
+          </a:p>
+          <a:p>
+            <a:pPr marL="0" indent="0">
+              <a:buNone/>
+            </a:pPr>
+            <a:r>
+              <a:rPr lang="en-US" sz="2000" dirty="0" smtClean="0"/>
+              <a:t>it-&gt;first – </a:t>
+            </a:r>
+            <a:r>
+              <a:rPr lang="ru-RU" sz="2000" dirty="0" smtClean="0"/>
+              <a:t>ключ; </a:t>
+            </a:r>
+          </a:p>
+          <a:p>
+            <a:pPr marL="0" indent="0">
+              <a:buNone/>
+            </a:pPr>
+            <a:r>
+              <a:rPr lang="en-US" sz="2000" dirty="0" smtClean="0"/>
+              <a:t>it-&gt;second – </a:t>
+            </a:r>
+            <a:r>
+              <a:rPr lang="ru-RU" sz="2000" dirty="0" smtClean="0"/>
+              <a:t>соответствующее значение</a:t>
+            </a:r>
+            <a:endParaRPr lang="en-US" sz="2000" dirty="0" smtClean="0"/>
+          </a:p>
+          <a:p>
+            <a:r>
+              <a:rPr lang="ru-RU" sz="2000" dirty="0" smtClean="0"/>
+              <a:t>Инкрементирование итератора </a:t>
+            </a:r>
+            <a:r>
+              <a:rPr lang="en-US" sz="2000" dirty="0" err="1" smtClean="0"/>
+              <a:t>std</a:t>
+            </a:r>
+            <a:r>
+              <a:rPr lang="en-US" sz="2000" dirty="0" smtClean="0"/>
+              <a:t>::set </a:t>
+            </a:r>
+            <a:r>
+              <a:rPr lang="ru-RU" sz="2000" dirty="0" smtClean="0"/>
+              <a:t>или </a:t>
+            </a:r>
+            <a:r>
+              <a:rPr lang="en-US" sz="2000" dirty="0" err="1" smtClean="0"/>
+              <a:t>std:map</a:t>
+            </a:r>
+            <a:r>
+              <a:rPr lang="en-US" sz="2000" dirty="0" smtClean="0"/>
+              <a:t> </a:t>
+            </a:r>
+            <a:r>
+              <a:rPr lang="ru-RU" sz="2000" dirty="0" smtClean="0"/>
+              <a:t>выполняет </a:t>
+            </a:r>
+            <a:r>
+              <a:rPr lang="en-US" sz="2000" dirty="0" smtClean="0"/>
+              <a:t>in-order depth-first </a:t>
+            </a:r>
+            <a:r>
+              <a:rPr lang="ru-RU" sz="2000" dirty="0" smtClean="0"/>
+              <a:t>обход дерева. </a:t>
+            </a:r>
+            <a:endParaRPr lang="ru-RU" sz="2000" dirty="0"/>
+          </a:p>
+          <a:p>
+            <a:r>
+              <a:rPr lang="ru-RU" sz="2000" dirty="0" smtClean="0"/>
+              <a:t>Поскольку </a:t>
+            </a:r>
+            <a:r>
+              <a:rPr lang="en-US" sz="2000" dirty="0" err="1"/>
+              <a:t>std</a:t>
+            </a:r>
+            <a:r>
+              <a:rPr lang="en-US" sz="2000" dirty="0"/>
+              <a:t>::set </a:t>
+            </a:r>
+            <a:r>
+              <a:rPr lang="ru-RU" sz="2000" dirty="0" smtClean="0"/>
+              <a:t>и </a:t>
+            </a:r>
+            <a:r>
+              <a:rPr lang="en-US" sz="2000" dirty="0" err="1"/>
+              <a:t>std:map</a:t>
+            </a:r>
+            <a:r>
+              <a:rPr lang="en-US" sz="2000" dirty="0"/>
+              <a:t> </a:t>
+            </a:r>
+            <a:r>
+              <a:rPr lang="ru-RU" sz="2000" dirty="0" smtClean="0"/>
+              <a:t>– </a:t>
+            </a:r>
+            <a:r>
+              <a:rPr lang="en-US" sz="2000" dirty="0" smtClean="0"/>
+              <a:t>BST, </a:t>
+            </a:r>
+            <a:r>
+              <a:rPr lang="ru-RU" sz="2000" dirty="0" smtClean="0"/>
+              <a:t>элементы будут получены в порядке возрастания</a:t>
+            </a:r>
+            <a:r>
+              <a:rPr lang="en-US" sz="2000" dirty="0" smtClean="0"/>
+              <a:t> </a:t>
+            </a:r>
+            <a:r>
+              <a:rPr lang="ru-RU" sz="2000" dirty="0" smtClean="0"/>
+              <a:t>из значения (</a:t>
+            </a:r>
+            <a:r>
+              <a:rPr lang="en-US" sz="2000" dirty="0" err="1" smtClean="0"/>
+              <a:t>std</a:t>
+            </a:r>
+            <a:r>
+              <a:rPr lang="en-US" sz="2000" dirty="0" smtClean="0"/>
+              <a:t>::set</a:t>
+            </a:r>
+            <a:r>
+              <a:rPr lang="ru-RU" sz="2000" dirty="0" smtClean="0"/>
+              <a:t>)</a:t>
+            </a:r>
+            <a:r>
+              <a:rPr lang="en-US" sz="2000" dirty="0" smtClean="0"/>
+              <a:t> </a:t>
+            </a:r>
+            <a:r>
+              <a:rPr lang="ru-RU" sz="2000" dirty="0" smtClean="0"/>
+              <a:t>или ключа (</a:t>
+            </a:r>
+            <a:r>
+              <a:rPr lang="en-US" sz="2000" dirty="0" err="1" smtClean="0"/>
+              <a:t>std</a:t>
+            </a:r>
+            <a:r>
+              <a:rPr lang="en-US" sz="2000" dirty="0" smtClean="0"/>
+              <a:t>::map</a:t>
+            </a:r>
+            <a:r>
+              <a:rPr lang="ru-RU" sz="2000" dirty="0" smtClean="0"/>
+              <a:t>)</a:t>
+            </a:r>
+            <a:r>
+              <a:rPr lang="en-US" sz="2000" dirty="0" smtClean="0"/>
+              <a:t>. </a:t>
+            </a:r>
+            <a:r>
+              <a:rPr lang="ru-RU" sz="2000" dirty="0"/>
+              <a:t>И</a:t>
+            </a:r>
+            <a:r>
+              <a:rPr lang="ru-RU" sz="2000" dirty="0" smtClean="0"/>
+              <a:t>ли в порядке убывания, в зависимости от шаблонного параметра </a:t>
+            </a:r>
+            <a:r>
+              <a:rPr lang="en-US" sz="2000" dirty="0" smtClean="0"/>
+              <a:t>Compare</a:t>
+            </a:r>
+            <a:r>
+              <a:rPr lang="ru-RU" sz="2000" dirty="0" smtClean="0"/>
+              <a:t>)</a:t>
+            </a:r>
+          </a:p>
+          <a:p>
+            <a:r>
+              <a:rPr lang="ru-RU" sz="2000" dirty="0" smtClean="0"/>
+              <a:t>Вставка не </a:t>
+            </a:r>
+            <a:r>
+              <a:rPr lang="ru-RU" sz="2000" dirty="0" err="1" smtClean="0"/>
+              <a:t>инвалидирует</a:t>
+            </a:r>
+            <a:r>
+              <a:rPr lang="ru-RU" sz="2000" dirty="0" smtClean="0"/>
+              <a:t> ни ссылки, ни итераторы</a:t>
+            </a:r>
+          </a:p>
+          <a:p>
+            <a:r>
+              <a:rPr lang="ru-RU" sz="2000" dirty="0" smtClean="0"/>
+              <a:t>Удаление </a:t>
+            </a:r>
+            <a:r>
+              <a:rPr lang="ru-RU" sz="2000" dirty="0" err="1" smtClean="0"/>
+              <a:t>инвалидирует</a:t>
+            </a:r>
+            <a:r>
+              <a:rPr lang="ru-RU" sz="2000" dirty="0" smtClean="0"/>
+              <a:t> ссылки и итераторы только на удалённый элемент</a:t>
+            </a:r>
+          </a:p>
+          <a:p>
+            <a:endParaRPr lang="en-US" sz="2000" dirty="0"/>
+          </a:p>
+        </p:txBody>
+      </p:sp>
+      <p:sp>
+        <p:nvSpPr>
+          <p:cNvPr id="4" name="Заголовок 1"/>
+          <p:cNvSpPr>
+            <a:spLocks noGrp="1"/>
+          </p:cNvSpPr>
+          <p:nvPr>
+            <p:ph type="title"/>
+          </p:nvPr>
+        </p:nvSpPr>
+        <p:spPr>
+          <a:xfrm>
+            <a:off x="260517" y="159139"/>
+            <a:ext cx="11728007" cy="653591"/>
+          </a:xfrm>
+          <a:solidFill>
+            <a:schemeClr val="bg1"/>
+          </a:solidFill>
+          <a:ln>
+            <a:solidFill>
+              <a:schemeClr val="tx1"/>
+            </a:solidFill>
+          </a:ln>
+        </p:spPr>
+        <p:txBody>
+          <a:bodyPr/>
+          <a:lstStyle/>
+          <a:p>
+            <a:pPr algn="ctr"/>
+            <a:r>
+              <a:rPr lang="en-US" dirty="0" err="1" smtClean="0"/>
+              <a:t>std</a:t>
+            </a:r>
+            <a:r>
+              <a:rPr lang="en-US" dirty="0" smtClean="0"/>
+              <a:t>::set, </a:t>
+            </a:r>
+            <a:r>
+              <a:rPr lang="en-US" dirty="0" err="1" smtClean="0"/>
+              <a:t>std</a:t>
+            </a:r>
+            <a:r>
+              <a:rPr lang="en-US" dirty="0" smtClean="0"/>
+              <a:t>::map: </a:t>
+            </a:r>
+            <a:r>
+              <a:rPr lang="ru-RU" dirty="0" smtClean="0"/>
+              <a:t>итераторы</a:t>
+            </a:r>
+            <a:endParaRPr lang="en-US" dirty="0"/>
+          </a:p>
+        </p:txBody>
+      </p:sp>
+      <p:pic>
+        <p:nvPicPr>
+          <p:cNvPr id="1026" name="Picture 2" descr="https://upload.wikimedia.org/wikipedia/commons/thumb/7/75/Sorted_binary_tree_ALL_RGB.svg/293px-Sorted_binary_tree_ALL_RGB.svg.png"/>
+          <p:cNvPicPr>
+            <a:picLocks noChangeAspect="1" noChangeArrowheads="1"/>
+          </p:cNvPicPr>
+          <p:nvPr/>
+        </p:nvPicPr>
+        <p:blipFill>
+          <a:blip r:embed="rId2">
+            <a:extLst>
+              <a:ext uri="{28A0092B-C50C-407E-A947-70E740481C1C}">
+                <a14:useLocalDpi xmlns:a14="http://schemas.microsoft.com/office/drawing/2010/main" val="0"/>
+              </a:ext>
+            </a:extLst>
+          </a:blip>
+          <a:srcRect/>
+          <a:stretch>
+            <a:fillRect/>
+          </a:stretch>
+        </p:blipFill>
+        <p:spPr bwMode="auto">
+          <a:xfrm>
+            <a:off x="786989" y="1636596"/>
+            <a:ext cx="3378610" cy="2882773"/>
+          </a:xfrm>
+          <a:prstGeom prst="rect">
+            <a:avLst/>
+          </a:prstGeom>
+          <a:noFill/>
+          <a:extLst>
+            <a:ext uri="{909E8E84-426E-40DD-AFC4-6F175D3DCCD1}">
+              <a14:hiddenFill xmlns:a14="http://schemas.microsoft.com/office/drawing/2010/main">
+                <a:solidFill>
+                  <a:srgbClr val="FFFFFF"/>
+                </a:solidFill>
+              </a14:hiddenFill>
+            </a:ext>
+          </a:extLst>
+        </p:spPr>
+      </p:pic>
+      <p:sp>
+        <p:nvSpPr>
+          <p:cNvPr id="5" name="Прямоугольник 4"/>
+          <p:cNvSpPr/>
+          <p:nvPr/>
+        </p:nvSpPr>
+        <p:spPr>
+          <a:xfrm>
+            <a:off x="417535" y="4694673"/>
+            <a:ext cx="4837956" cy="1754326"/>
+          </a:xfrm>
+          <a:prstGeom prst="rect">
+            <a:avLst/>
+          </a:prstGeom>
+        </p:spPr>
+        <p:txBody>
+          <a:bodyPr wrap="square">
+            <a:spAutoFit/>
+          </a:bodyPr>
+          <a:lstStyle/>
+          <a:p>
+            <a:pPr>
+              <a:buFont typeface="Arial" panose="020B0604020202020204" pitchFamily="34" charset="0"/>
+              <a:buChar char="•"/>
+            </a:pPr>
+            <a:r>
+              <a:rPr lang="en-US" i="1" dirty="0">
+                <a:solidFill>
+                  <a:srgbClr val="202122"/>
+                </a:solidFill>
+                <a:latin typeface="Arial" panose="020B0604020202020204" pitchFamily="34" charset="0"/>
+              </a:rPr>
+              <a:t>Pre-order (node visited at position red </a:t>
+            </a:r>
+            <a:r>
+              <a:rPr lang="en-US" i="1" dirty="0">
+                <a:solidFill>
+                  <a:srgbClr val="FF0000"/>
+                </a:solidFill>
+                <a:latin typeface="Arial" panose="020B0604020202020204" pitchFamily="34" charset="0"/>
+              </a:rPr>
+              <a:t>●</a:t>
+            </a:r>
+            <a:r>
+              <a:rPr lang="en-US" i="1" dirty="0">
+                <a:solidFill>
+                  <a:srgbClr val="202122"/>
+                </a:solidFill>
+                <a:latin typeface="Arial" panose="020B0604020202020204" pitchFamily="34" charset="0"/>
+              </a:rPr>
+              <a:t>)</a:t>
+            </a:r>
+            <a:r>
+              <a:rPr lang="en-US" dirty="0">
+                <a:solidFill>
+                  <a:srgbClr val="202122"/>
+                </a:solidFill>
+                <a:latin typeface="Arial" panose="020B0604020202020204" pitchFamily="34" charset="0"/>
+              </a:rPr>
+              <a:t>:</a:t>
+            </a:r>
+            <a:br>
+              <a:rPr lang="en-US" dirty="0">
+                <a:solidFill>
+                  <a:srgbClr val="202122"/>
+                </a:solidFill>
+                <a:latin typeface="Arial" panose="020B0604020202020204" pitchFamily="34" charset="0"/>
+              </a:rPr>
+            </a:br>
+            <a:r>
+              <a:rPr lang="en-US" dirty="0">
+                <a:solidFill>
+                  <a:srgbClr val="202122"/>
+                </a:solidFill>
+                <a:latin typeface="Arial" panose="020B0604020202020204" pitchFamily="34" charset="0"/>
+              </a:rPr>
+              <a:t>    F, B, A, D, C, E, G, I, H;</a:t>
+            </a:r>
+          </a:p>
+          <a:p>
+            <a:pPr>
+              <a:buFont typeface="Arial" panose="020B0604020202020204" pitchFamily="34" charset="0"/>
+              <a:buChar char="•"/>
+            </a:pPr>
+            <a:r>
+              <a:rPr lang="en-US" i="1" dirty="0">
+                <a:solidFill>
+                  <a:srgbClr val="202122"/>
+                </a:solidFill>
+                <a:latin typeface="Arial" panose="020B0604020202020204" pitchFamily="34" charset="0"/>
+              </a:rPr>
+              <a:t>In-order (node visited at position green </a:t>
+            </a:r>
+            <a:r>
+              <a:rPr lang="en-US" i="1" dirty="0">
+                <a:solidFill>
+                  <a:srgbClr val="00FF00"/>
+                </a:solidFill>
+                <a:latin typeface="Arial" panose="020B0604020202020204" pitchFamily="34" charset="0"/>
+              </a:rPr>
+              <a:t>●</a:t>
+            </a:r>
+            <a:r>
+              <a:rPr lang="en-US" i="1" dirty="0">
+                <a:solidFill>
+                  <a:srgbClr val="202122"/>
+                </a:solidFill>
+                <a:latin typeface="Arial" panose="020B0604020202020204" pitchFamily="34" charset="0"/>
+              </a:rPr>
+              <a:t>)</a:t>
+            </a:r>
+            <a:r>
+              <a:rPr lang="en-US" dirty="0">
+                <a:solidFill>
+                  <a:srgbClr val="202122"/>
+                </a:solidFill>
+                <a:latin typeface="Arial" panose="020B0604020202020204" pitchFamily="34" charset="0"/>
+              </a:rPr>
+              <a:t>:</a:t>
+            </a:r>
+            <a:br>
+              <a:rPr lang="en-US" dirty="0">
+                <a:solidFill>
+                  <a:srgbClr val="202122"/>
+                </a:solidFill>
+                <a:latin typeface="Arial" panose="020B0604020202020204" pitchFamily="34" charset="0"/>
+              </a:rPr>
+            </a:br>
+            <a:r>
+              <a:rPr lang="en-US" dirty="0">
+                <a:solidFill>
+                  <a:srgbClr val="202122"/>
+                </a:solidFill>
+                <a:latin typeface="Arial" panose="020B0604020202020204" pitchFamily="34" charset="0"/>
+              </a:rPr>
+              <a:t>    A, B, C, D, E, F, G, H, I;</a:t>
+            </a:r>
+          </a:p>
+          <a:p>
+            <a:pPr>
+              <a:buFont typeface="Arial" panose="020B0604020202020204" pitchFamily="34" charset="0"/>
+              <a:buChar char="•"/>
+            </a:pPr>
+            <a:r>
+              <a:rPr lang="en-US" i="1" dirty="0">
+                <a:solidFill>
+                  <a:srgbClr val="202122"/>
+                </a:solidFill>
+                <a:latin typeface="Arial" panose="020B0604020202020204" pitchFamily="34" charset="0"/>
+              </a:rPr>
+              <a:t>Post-order (node visited at position blue </a:t>
+            </a:r>
+            <a:r>
+              <a:rPr lang="en-US" i="1" dirty="0">
+                <a:solidFill>
+                  <a:srgbClr val="2A7FFF"/>
+                </a:solidFill>
+                <a:latin typeface="Arial" panose="020B0604020202020204" pitchFamily="34" charset="0"/>
+              </a:rPr>
+              <a:t>●</a:t>
+            </a:r>
+            <a:r>
+              <a:rPr lang="en-US" i="1" dirty="0">
+                <a:solidFill>
+                  <a:srgbClr val="202122"/>
+                </a:solidFill>
+                <a:latin typeface="Arial" panose="020B0604020202020204" pitchFamily="34" charset="0"/>
+              </a:rPr>
+              <a:t>)</a:t>
+            </a:r>
+            <a:r>
+              <a:rPr lang="en-US" dirty="0">
+                <a:solidFill>
+                  <a:srgbClr val="202122"/>
+                </a:solidFill>
+                <a:latin typeface="Arial" panose="020B0604020202020204" pitchFamily="34" charset="0"/>
+              </a:rPr>
+              <a:t>:</a:t>
+            </a:r>
+            <a:br>
+              <a:rPr lang="en-US" dirty="0">
+                <a:solidFill>
+                  <a:srgbClr val="202122"/>
+                </a:solidFill>
+                <a:latin typeface="Arial" panose="020B0604020202020204" pitchFamily="34" charset="0"/>
+              </a:rPr>
+            </a:br>
+            <a:r>
+              <a:rPr lang="en-US" dirty="0">
+                <a:solidFill>
+                  <a:srgbClr val="202122"/>
+                </a:solidFill>
+                <a:latin typeface="Arial" panose="020B0604020202020204" pitchFamily="34" charset="0"/>
+              </a:rPr>
+              <a:t>    A, C, E, D, B, H, I, G, F.</a:t>
+            </a:r>
+            <a:endParaRPr lang="en-US" b="0" i="0" dirty="0">
+              <a:solidFill>
+                <a:srgbClr val="202122"/>
+              </a:solidFill>
+              <a:effectLst/>
+              <a:latin typeface="Arial" panose="020B0604020202020204" pitchFamily="34" charset="0"/>
+            </a:endParaRPr>
+          </a:p>
+        </p:txBody>
+      </p:sp>
+      <p:sp>
+        <p:nvSpPr>
+          <p:cNvPr id="6" name="TextBox 5"/>
+          <p:cNvSpPr txBox="1"/>
+          <p:nvPr/>
+        </p:nvSpPr>
+        <p:spPr>
+          <a:xfrm>
+            <a:off x="526473" y="1099127"/>
+            <a:ext cx="4257897" cy="369332"/>
+          </a:xfrm>
+          <a:prstGeom prst="rect">
+            <a:avLst/>
+          </a:prstGeom>
+          <a:noFill/>
+        </p:spPr>
+        <p:txBody>
+          <a:bodyPr wrap="none" rtlCol="0">
+            <a:spAutoFit/>
+          </a:bodyPr>
+          <a:lstStyle/>
+          <a:p>
+            <a:r>
+              <a:rPr lang="ru-RU" dirty="0" smtClean="0"/>
+              <a:t>Поиск в глубину (</a:t>
+            </a:r>
+            <a:r>
+              <a:rPr lang="en-US" dirty="0" smtClean="0"/>
+              <a:t>depth-first traversal</a:t>
+            </a:r>
+            <a:r>
+              <a:rPr lang="ru-RU" dirty="0" smtClean="0"/>
+              <a:t>)</a:t>
+            </a:r>
+            <a:endParaRPr lang="en-US" dirty="0"/>
+          </a:p>
+        </p:txBody>
+      </p:sp>
+      <p:sp>
+        <p:nvSpPr>
+          <p:cNvPr id="7" name="Прямоугольник 6"/>
+          <p:cNvSpPr/>
+          <p:nvPr/>
+        </p:nvSpPr>
+        <p:spPr>
+          <a:xfrm>
+            <a:off x="417535" y="5350402"/>
+            <a:ext cx="4572000" cy="542398"/>
+          </a:xfrm>
+          <a:prstGeom prst="rect">
+            <a:avLst/>
+          </a:prstGeom>
+          <a:noFill/>
+        </p:spPr>
+        <p:style>
+          <a:lnRef idx="2">
+            <a:schemeClr val="accent1">
+              <a:shade val="50000"/>
+            </a:schemeClr>
+          </a:lnRef>
+          <a:fillRef idx="1">
+            <a:schemeClr val="accent1"/>
+          </a:fillRef>
+          <a:effectRef idx="0">
+            <a:schemeClr val="accent1"/>
+          </a:effectRef>
+          <a:fontRef idx="minor">
+            <a:schemeClr val="lt1"/>
+          </a:fontRef>
+        </p:style>
+        <p:txBody>
+          <a:bodyPr rtlCol="0" anchor="ctr"/>
+          <a:lstStyle/>
+          <a:p>
+            <a:pPr algn="ctr"/>
+            <a:endParaRPr lang="en-US"/>
+          </a:p>
+        </p:txBody>
+      </p:sp>
+    </p:spTree>
+    <p:extLst>
+      <p:ext uri="{BB962C8B-B14F-4D97-AF65-F5344CB8AC3E}">
+        <p14:creationId xmlns:p14="http://schemas.microsoft.com/office/powerpoint/2010/main" val="209639048"/>
+      </p:ext>
+    </p:extLst>
+  </p:cSld>
+  <p:clrMapOvr>
+    <a:masterClrMapping/>
+  </p:clrMapOvr>
+</p:sld>
+</file>
+
+<file path=ppt/slides/slide17.xml><?xml version="1.0" encoding="utf-8"?>
+<p:sld xmlns:a="http://schemas.openxmlformats.org/drawingml/2006/main" xmlns:r="http://schemas.openxmlformats.org/officeDocument/2006/relationships" xmlns:p="http://schemas.openxmlformats.org/presentationml/2006/main">
+  <p:cSld>
+    <p:spTree>
+      <p:nvGrpSpPr>
+        <p:cNvPr id="1" name=""/>
+        <p:cNvGrpSpPr/>
+        <p:nvPr/>
+      </p:nvGrpSpPr>
+      <p:grpSpPr>
+        <a:xfrm>
+          <a:off x="0" y="0"/>
+          <a:ext cx="0" cy="0"/>
+          <a:chOff x="0" y="0"/>
+          <a:chExt cx="0" cy="0"/>
+        </a:xfrm>
+      </p:grpSpPr>
+      <p:sp>
+        <p:nvSpPr>
+          <p:cNvPr id="3" name="Объект 2"/>
+          <p:cNvSpPr>
+            <a:spLocks noGrp="1"/>
+          </p:cNvSpPr>
+          <p:nvPr>
+            <p:ph idx="1"/>
+          </p:nvPr>
+        </p:nvSpPr>
+        <p:spPr>
+          <a:xfrm>
+            <a:off x="7315200" y="1054189"/>
+            <a:ext cx="4673324" cy="3954362"/>
+          </a:xfrm>
+          <a:solidFill>
+            <a:schemeClr val="bg1"/>
+          </a:solidFill>
+        </p:spPr>
+        <p:txBody>
+          <a:bodyPr>
+            <a:normAutofit/>
+          </a:bodyPr>
+          <a:lstStyle/>
+          <a:p>
+            <a:r>
+              <a:rPr lang="en-US" dirty="0" err="1" smtClean="0"/>
+              <a:t>std</a:t>
+            </a:r>
+            <a:r>
+              <a:rPr lang="en-US" dirty="0" smtClean="0"/>
+              <a:t>::</a:t>
+            </a:r>
+            <a:r>
+              <a:rPr lang="en-US" dirty="0" err="1" smtClean="0"/>
+              <a:t>multimap</a:t>
+            </a:r>
+            <a:r>
+              <a:rPr lang="en-US" dirty="0" smtClean="0"/>
+              <a:t>, </a:t>
+            </a:r>
+            <a:r>
+              <a:rPr lang="en-US" dirty="0" err="1" smtClean="0"/>
+              <a:t>std</a:t>
+            </a:r>
+            <a:r>
+              <a:rPr lang="en-US" dirty="0" smtClean="0"/>
+              <a:t>::</a:t>
+            </a:r>
+            <a:r>
+              <a:rPr lang="en-US" dirty="0" err="1" smtClean="0"/>
+              <a:t>multiset</a:t>
+            </a:r>
+            <a:r>
+              <a:rPr lang="en-US" dirty="0" smtClean="0"/>
+              <a:t> – </a:t>
+            </a:r>
+            <a:r>
+              <a:rPr lang="ru-RU" dirty="0" smtClean="0"/>
+              <a:t>то же, что и </a:t>
+            </a:r>
+            <a:r>
+              <a:rPr lang="en-US" dirty="0" err="1"/>
+              <a:t>std</a:t>
+            </a:r>
+            <a:r>
+              <a:rPr lang="en-US" dirty="0" smtClean="0"/>
+              <a:t>::map</a:t>
+            </a:r>
+            <a:r>
+              <a:rPr lang="ru-RU" dirty="0" smtClean="0"/>
+              <a:t> и </a:t>
+            </a:r>
+            <a:r>
+              <a:rPr lang="en-US" dirty="0" err="1" smtClean="0"/>
+              <a:t>std</a:t>
+            </a:r>
+            <a:r>
+              <a:rPr lang="en-US" dirty="0" smtClean="0"/>
+              <a:t>::set</a:t>
+            </a:r>
+            <a:r>
+              <a:rPr lang="ru-RU" dirty="0" smtClean="0"/>
+              <a:t> соответственно, но с возможностью хранения дубликатов</a:t>
+            </a:r>
+            <a:r>
+              <a:rPr lang="en-US" dirty="0" smtClean="0"/>
+              <a:t> (</a:t>
+            </a:r>
+            <a:r>
+              <a:rPr lang="en-US" dirty="0" err="1"/>
+              <a:t>std</a:t>
+            </a:r>
+            <a:r>
+              <a:rPr lang="en-US" dirty="0"/>
+              <a:t>::map</a:t>
+            </a:r>
+            <a:r>
+              <a:rPr lang="ru-RU" dirty="0"/>
+              <a:t> </a:t>
+            </a:r>
+            <a:r>
+              <a:rPr lang="en-US" dirty="0" smtClean="0"/>
+              <a:t>–</a:t>
+            </a:r>
+            <a:r>
+              <a:rPr lang="ru-RU" dirty="0" smtClean="0"/>
+              <a:t>дубликатов ключа</a:t>
+            </a:r>
+            <a:r>
+              <a:rPr lang="en-US" dirty="0" smtClean="0"/>
+              <a:t>)</a:t>
+            </a:r>
+          </a:p>
+          <a:p>
+            <a:r>
+              <a:rPr lang="ru-RU" dirty="0" smtClean="0"/>
+              <a:t>Дубликаты хранятся в порядке вставки</a:t>
+            </a:r>
+          </a:p>
+          <a:p>
+            <a:r>
+              <a:rPr lang="ru-RU" dirty="0" smtClean="0"/>
+              <a:t>Ключевое различие в интерфейсе – возвращаемое значение метода </a:t>
+            </a:r>
+            <a:r>
+              <a:rPr lang="en-US" dirty="0" smtClean="0"/>
+              <a:t>insert</a:t>
+            </a:r>
+            <a:r>
+              <a:rPr lang="ru-RU" dirty="0" smtClean="0"/>
+              <a:t>: у </a:t>
+            </a:r>
+            <a:r>
+              <a:rPr lang="en-US" dirty="0" err="1" smtClean="0"/>
+              <a:t>std</a:t>
+            </a:r>
+            <a:r>
+              <a:rPr lang="en-US" dirty="0" smtClean="0"/>
+              <a:t>::set </a:t>
+            </a:r>
+            <a:r>
+              <a:rPr lang="ru-RU" dirty="0" smtClean="0"/>
+              <a:t>и </a:t>
+            </a:r>
+            <a:r>
+              <a:rPr lang="en-US" dirty="0" err="1" smtClean="0"/>
+              <a:t>std</a:t>
+            </a:r>
+            <a:r>
+              <a:rPr lang="en-US" dirty="0" smtClean="0"/>
+              <a:t>::map </a:t>
+            </a:r>
+            <a:r>
+              <a:rPr lang="ru-RU" dirty="0" smtClean="0"/>
+              <a:t>этот метод даёт возможность проверить, была ли вставка успешной или такой элемент уже есть в контейнере</a:t>
+            </a:r>
+            <a:endParaRPr lang="en-US" dirty="0" smtClean="0"/>
+          </a:p>
+          <a:p>
+            <a:endParaRPr lang="en-US" dirty="0"/>
+          </a:p>
+        </p:txBody>
+      </p:sp>
+      <p:sp>
+        <p:nvSpPr>
+          <p:cNvPr id="8" name="Заголовок 1"/>
+          <p:cNvSpPr>
+            <a:spLocks noGrp="1"/>
+          </p:cNvSpPr>
+          <p:nvPr>
+            <p:ph type="title"/>
+          </p:nvPr>
+        </p:nvSpPr>
+        <p:spPr>
+          <a:xfrm>
+            <a:off x="260517" y="159139"/>
+            <a:ext cx="11728007" cy="653591"/>
+          </a:xfrm>
+          <a:solidFill>
+            <a:schemeClr val="bg1"/>
+          </a:solidFill>
+          <a:ln>
+            <a:solidFill>
+              <a:schemeClr val="tx1"/>
+            </a:solidFill>
+          </a:ln>
+        </p:spPr>
+        <p:txBody>
+          <a:bodyPr/>
+          <a:lstStyle/>
+          <a:p>
+            <a:pPr algn="ctr"/>
+            <a:r>
+              <a:rPr lang="en-US" dirty="0" err="1" smtClean="0"/>
+              <a:t>std</a:t>
+            </a:r>
+            <a:r>
+              <a:rPr lang="en-US" dirty="0" smtClean="0"/>
+              <a:t>::</a:t>
+            </a:r>
+            <a:r>
+              <a:rPr lang="en-US" dirty="0" err="1" smtClean="0"/>
+              <a:t>multiset</a:t>
+            </a:r>
+            <a:r>
+              <a:rPr lang="en-US" dirty="0" smtClean="0"/>
+              <a:t>, </a:t>
+            </a:r>
+            <a:r>
+              <a:rPr lang="en-US" dirty="0" err="1" smtClean="0"/>
+              <a:t>std</a:t>
+            </a:r>
+            <a:r>
+              <a:rPr lang="en-US" dirty="0" smtClean="0"/>
+              <a:t>::</a:t>
+            </a:r>
+            <a:r>
+              <a:rPr lang="en-US" dirty="0" err="1" smtClean="0"/>
+              <a:t>multimap</a:t>
+            </a:r>
+            <a:endParaRPr lang="en-US" dirty="0"/>
+          </a:p>
+        </p:txBody>
+      </p:sp>
+      <p:pic>
+        <p:nvPicPr>
+          <p:cNvPr id="9" name="Рисунок 8"/>
+          <p:cNvPicPr>
+            <a:picLocks noChangeAspect="1"/>
+          </p:cNvPicPr>
+          <p:nvPr/>
+        </p:nvPicPr>
+        <p:blipFill>
+          <a:blip r:embed="rId2"/>
+          <a:stretch>
+            <a:fillRect/>
+          </a:stretch>
+        </p:blipFill>
+        <p:spPr>
+          <a:xfrm>
+            <a:off x="398956" y="1652459"/>
+            <a:ext cx="6049219" cy="838317"/>
+          </a:xfrm>
+          <a:prstGeom prst="rect">
+            <a:avLst/>
+          </a:prstGeom>
+        </p:spPr>
+      </p:pic>
+      <p:pic>
+        <p:nvPicPr>
+          <p:cNvPr id="10" name="Рисунок 9"/>
+          <p:cNvPicPr>
+            <a:picLocks noChangeAspect="1"/>
+          </p:cNvPicPr>
+          <p:nvPr/>
+        </p:nvPicPr>
+        <p:blipFill>
+          <a:blip r:embed="rId3"/>
+          <a:stretch>
+            <a:fillRect/>
+          </a:stretch>
+        </p:blipFill>
+        <p:spPr>
+          <a:xfrm>
+            <a:off x="398956" y="3330505"/>
+            <a:ext cx="6220693" cy="838317"/>
+          </a:xfrm>
+          <a:prstGeom prst="rect">
+            <a:avLst/>
+          </a:prstGeom>
+        </p:spPr>
+      </p:pic>
+      <p:sp>
+        <p:nvSpPr>
+          <p:cNvPr id="11" name="Прямоугольник 10"/>
+          <p:cNvSpPr/>
+          <p:nvPr/>
+        </p:nvSpPr>
+        <p:spPr>
+          <a:xfrm>
+            <a:off x="2348668" y="2809909"/>
+            <a:ext cx="1635384" cy="369332"/>
+          </a:xfrm>
+          <a:prstGeom prst="rect">
+            <a:avLst/>
+          </a:prstGeom>
+        </p:spPr>
+        <p:txBody>
+          <a:bodyPr wrap="none">
+            <a:spAutoFit/>
+          </a:bodyPr>
+          <a:lstStyle/>
+          <a:p>
+            <a:r>
+              <a:rPr lang="en-US" b="1" dirty="0" err="1" smtClean="0"/>
+              <a:t>std</a:t>
+            </a:r>
+            <a:r>
+              <a:rPr lang="en-US" b="1" dirty="0" smtClean="0"/>
+              <a:t>::</a:t>
+            </a:r>
+            <a:r>
+              <a:rPr lang="en-US" b="1" dirty="0" err="1" smtClean="0"/>
+              <a:t>multiset</a:t>
+            </a:r>
+            <a:r>
+              <a:rPr lang="en-US" b="1" dirty="0" smtClean="0"/>
+              <a:t> </a:t>
+            </a:r>
+            <a:endParaRPr lang="en-US" b="1" dirty="0"/>
+          </a:p>
+        </p:txBody>
+      </p:sp>
+      <p:sp>
+        <p:nvSpPr>
+          <p:cNvPr id="12" name="Прямоугольник 11"/>
+          <p:cNvSpPr/>
+          <p:nvPr/>
+        </p:nvSpPr>
+        <p:spPr>
+          <a:xfrm>
+            <a:off x="2629995" y="1068455"/>
+            <a:ext cx="1072730" cy="369332"/>
+          </a:xfrm>
+          <a:prstGeom prst="rect">
+            <a:avLst/>
+          </a:prstGeom>
+        </p:spPr>
+        <p:txBody>
+          <a:bodyPr wrap="none">
+            <a:spAutoFit/>
+          </a:bodyPr>
+          <a:lstStyle/>
+          <a:p>
+            <a:r>
+              <a:rPr lang="en-US" b="1" dirty="0" err="1" smtClean="0"/>
+              <a:t>std</a:t>
+            </a:r>
+            <a:r>
+              <a:rPr lang="en-US" b="1" dirty="0" smtClean="0"/>
+              <a:t>::set </a:t>
+            </a:r>
+            <a:endParaRPr lang="en-US" b="1" dirty="0"/>
+          </a:p>
+        </p:txBody>
+      </p:sp>
+      <p:sp>
+        <p:nvSpPr>
+          <p:cNvPr id="13" name="Объект 2"/>
+          <p:cNvSpPr txBox="1">
+            <a:spLocks/>
+          </p:cNvSpPr>
+          <p:nvPr/>
+        </p:nvSpPr>
+        <p:spPr>
+          <a:xfrm>
+            <a:off x="387110" y="5264276"/>
+            <a:ext cx="11601414" cy="1078213"/>
+          </a:xfrm>
+          <a:prstGeom prst="rect">
+            <a:avLst/>
+          </a:prstGeom>
+          <a:solidFill>
+            <a:schemeClr val="bg1"/>
+          </a:solidFill>
+        </p:spPr>
+        <p:txBody>
+          <a:bodyPr vert="horz" lIns="91440" tIns="45720" rIns="91440" bIns="45720" rtlCol="0">
+            <a:normAutofit/>
+          </a:bodyPr>
+          <a:lstStyle>
+            <a:lvl1pPr marL="342900" indent="-342900" algn="l" defTabSz="457200" rtl="0" eaLnBrk="1" latinLnBrk="0" hangingPunct="1">
+              <a:spcBef>
+                <a:spcPts val="1000"/>
+              </a:spcBef>
+              <a:spcAft>
+                <a:spcPts val="0"/>
+              </a:spcAft>
+              <a:buClr>
+                <a:schemeClr val="accent1"/>
+              </a:buClr>
+              <a:buSzPct val="80000"/>
+              <a:buFont typeface="Wingdings 3" charset="2"/>
+              <a:buChar char=""/>
+              <a:defRPr sz="1800" kern="1200">
+                <a:solidFill>
+                  <a:schemeClr val="tx1">
+                    <a:lumMod val="75000"/>
+                    <a:lumOff val="25000"/>
+                  </a:schemeClr>
+                </a:solidFill>
+                <a:latin typeface="+mn-lt"/>
+                <a:ea typeface="+mn-ea"/>
+                <a:cs typeface="+mn-cs"/>
+              </a:defRPr>
+            </a:lvl1pPr>
+            <a:lvl2pPr marL="742950" indent="-285750" algn="l" defTabSz="457200" rtl="0" eaLnBrk="1" latinLnBrk="0" hangingPunct="1">
+              <a:spcBef>
+                <a:spcPts val="1000"/>
+              </a:spcBef>
+              <a:spcAft>
+                <a:spcPts val="0"/>
+              </a:spcAft>
+              <a:buClr>
+                <a:schemeClr val="accent1"/>
+              </a:buClr>
+              <a:buSzPct val="80000"/>
+              <a:buFont typeface="Wingdings 3" charset="2"/>
+              <a:buChar char=""/>
+              <a:defRPr sz="1600" kern="1200">
+                <a:solidFill>
+                  <a:schemeClr val="tx1">
+                    <a:lumMod val="75000"/>
+                    <a:lumOff val="25000"/>
+                  </a:schemeClr>
+                </a:solidFill>
+                <a:latin typeface="+mn-lt"/>
+                <a:ea typeface="+mn-ea"/>
+                <a:cs typeface="+mn-cs"/>
+              </a:defRPr>
+            </a:lvl2pPr>
+            <a:lvl3pPr marL="1143000" indent="-228600" algn="l" defTabSz="457200" rtl="0" eaLnBrk="1" latinLnBrk="0" hangingPunct="1">
+              <a:spcBef>
+                <a:spcPts val="1000"/>
+              </a:spcBef>
+              <a:spcAft>
+                <a:spcPts val="0"/>
+              </a:spcAft>
+              <a:buClr>
+                <a:schemeClr val="accent1"/>
+              </a:buClr>
+              <a:buSzPct val="80000"/>
+              <a:buFont typeface="Wingdings 3" charset="2"/>
+              <a:buChar char=""/>
+              <a:defRPr sz="1400" kern="1200">
+                <a:solidFill>
+                  <a:schemeClr val="tx1">
+                    <a:lumMod val="75000"/>
+                    <a:lumOff val="25000"/>
+                  </a:schemeClr>
+                </a:solidFill>
+                <a:latin typeface="+mn-lt"/>
+                <a:ea typeface="+mn-ea"/>
+                <a:cs typeface="+mn-cs"/>
+              </a:defRPr>
+            </a:lvl3pPr>
+            <a:lvl4pPr marL="1600200" indent="-228600" algn="l" defTabSz="457200" rtl="0" eaLnBrk="1" latinLnBrk="0" hangingPunct="1">
+              <a:spcBef>
+                <a:spcPts val="1000"/>
+              </a:spcBef>
+              <a:spcAft>
+                <a:spcPts val="0"/>
+              </a:spcAft>
+              <a:buClr>
+                <a:schemeClr val="accent1"/>
+              </a:buClr>
+              <a:buSzPct val="80000"/>
+              <a:buFont typeface="Wingdings 3" charset="2"/>
+              <a:buChar char=""/>
+              <a:defRPr sz="1200" kern="1200">
+                <a:solidFill>
+                  <a:schemeClr val="tx1">
+                    <a:lumMod val="75000"/>
+                    <a:lumOff val="25000"/>
+                  </a:schemeClr>
+                </a:solidFill>
+                <a:latin typeface="+mn-lt"/>
+                <a:ea typeface="+mn-ea"/>
+                <a:cs typeface="+mn-cs"/>
+              </a:defRPr>
+            </a:lvl4pPr>
+            <a:lvl5pPr marL="2057400" indent="-228600" algn="l" defTabSz="457200" rtl="0" eaLnBrk="1" latinLnBrk="0" hangingPunct="1">
+              <a:spcBef>
+                <a:spcPts val="1000"/>
+              </a:spcBef>
+              <a:spcAft>
+                <a:spcPts val="0"/>
+              </a:spcAft>
+              <a:buClr>
+                <a:schemeClr val="accent1"/>
+              </a:buClr>
+              <a:buSzPct val="80000"/>
+              <a:buFont typeface="Wingdings 3" charset="2"/>
+              <a:buChar char=""/>
+              <a:defRPr sz="1200" kern="1200">
+                <a:solidFill>
+                  <a:schemeClr val="tx1">
+                    <a:lumMod val="75000"/>
+                    <a:lumOff val="25000"/>
+                  </a:schemeClr>
+                </a:solidFill>
+                <a:latin typeface="+mn-lt"/>
+                <a:ea typeface="+mn-ea"/>
+                <a:cs typeface="+mn-cs"/>
+              </a:defRPr>
+            </a:lvl5pPr>
+            <a:lvl6pPr marL="2514600" indent="-228600" algn="l" defTabSz="457200" rtl="0" eaLnBrk="1" latinLnBrk="0" hangingPunct="1">
+              <a:spcBef>
+                <a:spcPts val="1000"/>
+              </a:spcBef>
+              <a:spcAft>
+                <a:spcPts val="0"/>
+              </a:spcAft>
+              <a:buClr>
+                <a:schemeClr val="accent1"/>
+              </a:buClr>
+              <a:buSzPct val="80000"/>
+              <a:buFont typeface="Wingdings 3" charset="2"/>
+              <a:buChar char=""/>
+              <a:defRPr sz="1200" kern="1200">
+                <a:solidFill>
+                  <a:schemeClr val="tx1">
+                    <a:lumMod val="75000"/>
+                    <a:lumOff val="25000"/>
+                  </a:schemeClr>
+                </a:solidFill>
+                <a:latin typeface="+mn-lt"/>
+                <a:ea typeface="+mn-ea"/>
+                <a:cs typeface="+mn-cs"/>
+              </a:defRPr>
+            </a:lvl6pPr>
+            <a:lvl7pPr marL="2971800" indent="-228600" algn="l" defTabSz="457200" rtl="0" eaLnBrk="1" latinLnBrk="0" hangingPunct="1">
+              <a:spcBef>
+                <a:spcPts val="1000"/>
+              </a:spcBef>
+              <a:spcAft>
+                <a:spcPts val="0"/>
+              </a:spcAft>
+              <a:buClr>
+                <a:schemeClr val="accent1"/>
+              </a:buClr>
+              <a:buSzPct val="80000"/>
+              <a:buFont typeface="Wingdings 3" charset="2"/>
+              <a:buChar char=""/>
+              <a:defRPr sz="1200" kern="1200">
+                <a:solidFill>
+                  <a:schemeClr val="tx1">
+                    <a:lumMod val="75000"/>
+                    <a:lumOff val="25000"/>
+                  </a:schemeClr>
+                </a:solidFill>
+                <a:latin typeface="+mn-lt"/>
+                <a:ea typeface="+mn-ea"/>
+                <a:cs typeface="+mn-cs"/>
+              </a:defRPr>
+            </a:lvl7pPr>
+            <a:lvl8pPr marL="3429000" indent="-228600" algn="l" defTabSz="457200" rtl="0" eaLnBrk="1" latinLnBrk="0" hangingPunct="1">
+              <a:spcBef>
+                <a:spcPts val="1000"/>
+              </a:spcBef>
+              <a:spcAft>
+                <a:spcPts val="0"/>
+              </a:spcAft>
+              <a:buClr>
+                <a:schemeClr val="accent1"/>
+              </a:buClr>
+              <a:buSzPct val="80000"/>
+              <a:buFont typeface="Wingdings 3" charset="2"/>
+              <a:buChar char=""/>
+              <a:defRPr sz="1200" kern="1200">
+                <a:solidFill>
+                  <a:schemeClr val="tx1">
+                    <a:lumMod val="75000"/>
+                    <a:lumOff val="25000"/>
+                  </a:schemeClr>
+                </a:solidFill>
+                <a:latin typeface="+mn-lt"/>
+                <a:ea typeface="+mn-ea"/>
+                <a:cs typeface="+mn-cs"/>
+              </a:defRPr>
+            </a:lvl8pPr>
+            <a:lvl9pPr marL="3886200" indent="-228600" algn="l" defTabSz="457200" rtl="0" eaLnBrk="1" latinLnBrk="0" hangingPunct="1">
+              <a:spcBef>
+                <a:spcPts val="1000"/>
+              </a:spcBef>
+              <a:spcAft>
+                <a:spcPts val="0"/>
+              </a:spcAft>
+              <a:buClr>
+                <a:schemeClr val="accent1"/>
+              </a:buClr>
+              <a:buSzPct val="80000"/>
+              <a:buFont typeface="Wingdings 3" charset="2"/>
+              <a:buChar char=""/>
+              <a:defRPr sz="1200" kern="1200">
+                <a:solidFill>
+                  <a:schemeClr val="tx1">
+                    <a:lumMod val="75000"/>
+                    <a:lumOff val="25000"/>
+                  </a:schemeClr>
+                </a:solidFill>
+                <a:latin typeface="+mn-lt"/>
+                <a:ea typeface="+mn-ea"/>
+                <a:cs typeface="+mn-cs"/>
+              </a:defRPr>
+            </a:lvl9pPr>
+          </a:lstStyle>
+          <a:p>
+            <a:r>
+              <a:rPr lang="en-US" dirty="0" err="1" smtClean="0"/>
+              <a:t>posHint</a:t>
+            </a:r>
+            <a:r>
+              <a:rPr lang="en-US" dirty="0" smtClean="0"/>
+              <a:t> – </a:t>
+            </a:r>
+            <a:r>
+              <a:rPr lang="ru-RU" dirty="0" smtClean="0"/>
+              <a:t>итератор на узел, перед которым должен быть вставлен новый элемент. Если передан верный </a:t>
+            </a:r>
+            <a:r>
+              <a:rPr lang="en-US" dirty="0" err="1" smtClean="0"/>
+              <a:t>posHint</a:t>
+            </a:r>
+            <a:r>
+              <a:rPr lang="ru-RU" dirty="0" smtClean="0"/>
+              <a:t>, сложность вставки – </a:t>
+            </a:r>
+            <a:r>
+              <a:rPr lang="en-US" dirty="0" smtClean="0"/>
+              <a:t>O(1), </a:t>
+            </a:r>
+            <a:r>
+              <a:rPr lang="ru-RU" dirty="0" smtClean="0"/>
+              <a:t>иначе – </a:t>
+            </a:r>
+            <a:r>
+              <a:rPr lang="en-US" dirty="0" smtClean="0"/>
+              <a:t>O(n)</a:t>
+            </a:r>
+            <a:endParaRPr lang="en-US" dirty="0"/>
+          </a:p>
+        </p:txBody>
+      </p:sp>
+    </p:spTree>
+    <p:extLst>
+      <p:ext uri="{BB962C8B-B14F-4D97-AF65-F5344CB8AC3E}">
+        <p14:creationId xmlns:p14="http://schemas.microsoft.com/office/powerpoint/2010/main" val="391081390"/>
+      </p:ext>
+    </p:extLst>
+  </p:cSld>
+  <p:clrMapOvr>
+    <a:masterClrMapping/>
+  </p:clrMapOvr>
+</p:sld>
+</file>
+
 <file path=ppt/slides/slide2.xml><?xml version="1.0" encoding="utf-8"?>
 <p:sld xmlns:a="http://schemas.openxmlformats.org/drawingml/2006/main" xmlns:r="http://schemas.openxmlformats.org/officeDocument/2006/relationships" xmlns:p="http://schemas.openxmlformats.org/presentationml/2006/main">
   <p:cSld>
@@ -17682,7 +19039,7 @@
         </p:blipFill>
         <p:spPr>
           <a:xfrm>
-            <a:off x="301659" y="1385528"/>
+            <a:off x="301657" y="1557124"/>
             <a:ext cx="4803741" cy="1762841"/>
           </a:xfrm>
           <a:prstGeom prst="rect">
@@ -17734,7 +19091,7 @@
         </p:blipFill>
         <p:spPr>
           <a:xfrm>
-            <a:off x="522927" y="3441429"/>
+            <a:off x="515706" y="3590842"/>
             <a:ext cx="4375644" cy="2986901"/>
           </a:xfrm>
           <a:prstGeom prst="rect">
@@ -17758,7 +19115,7 @@
         </p:blipFill>
         <p:spPr>
           <a:xfrm>
-            <a:off x="6937032" y="3441429"/>
+            <a:off x="6973977" y="3590841"/>
             <a:ext cx="4348020" cy="2986901"/>
           </a:xfrm>
           <a:prstGeom prst="rect">
@@ -17782,7 +19139,7 @@
         </p:blipFill>
         <p:spPr>
           <a:xfrm>
-            <a:off x="5946432" y="1491343"/>
+            <a:off x="5862409" y="1610031"/>
             <a:ext cx="5978475" cy="1657026"/>
           </a:xfrm>
           <a:prstGeom prst="rect">
@@ -18784,7 +20141,6 @@
                         <a:rPr lang="ru-RU" dirty="0" smtClean="0"/>
                         <a:t>Вставка</a:t>
                       </a:r>
-                      <a:endParaRPr lang="ru-RU" dirty="0" smtClean="0"/>
                     </a:p>
                   </a:txBody>
                   <a:tcPr/>
@@ -19053,7 +20409,6 @@
               <a:rPr lang="en-US" dirty="0"/>
               <a:t>3</a:t>
             </a:r>
-            <a:endParaRPr lang="en-US" dirty="0"/>
           </a:p>
         </p:txBody>
       </p:sp>
@@ -20282,7 +21637,6 @@
               <a:rPr lang="en-US" dirty="0"/>
               <a:t>3</a:t>
             </a:r>
-            <a:endParaRPr lang="en-US" dirty="0"/>
           </a:p>
         </p:txBody>
       </p:sp>

</xml_diff>